<commit_message>
fixed issues in presentation
</commit_message>
<xml_diff>
--- a/rendering_spreadshirt_product_images_using_cloudinary.pptx
+++ b/rendering_spreadshirt_product_images_using_cloudinary.pptx
@@ -16668,38 +16668,6 @@
           </a:p>
         </p:txBody>
       </p:sp>
-      <p:sp>
-        <p:nvSpPr>
-          <p:cNvPr id="2" name="TextBox 1"/>
-          <p:cNvSpPr txBox="1"/>
-          <p:nvPr/>
-        </p:nvSpPr>
-        <p:spPr>
-          <a:xfrm>
-            <a:off x="6505304" y="4169473"/>
-            <a:ext cx="712375" cy="400110"/>
-          </a:xfrm>
-          <a:prstGeom prst="rect">
-            <a:avLst/>
-          </a:prstGeom>
-          <a:noFill/>
-        </p:spPr>
-        <p:txBody>
-          <a:bodyPr wrap="none" rtlCol="0">
-            <a:spAutoFit/>
-          </a:bodyPr>
-          <a:lstStyle/>
-          <a:p>
-            <a:r>
-              <a:rPr lang="en-US" sz="2000" b="1" dirty="0" smtClean="0">
-                <a:latin typeface="Arial" panose="020B0604020202020204" pitchFamily="34" charset="0"/>
-                <a:cs typeface="Arial" panose="020B0604020202020204" pitchFamily="34" charset="0"/>
-              </a:rPr>
-              <a:t>Yes!</a:t>
-            </a:r>
-          </a:p>
-        </p:txBody>
-      </p:sp>
     </p:spTree>
     <p:extLst>
       <p:ext uri="{BB962C8B-B14F-4D97-AF65-F5344CB8AC3E}">
@@ -18126,11 +18094,7 @@
           <a:p>
             <a:r>
               <a:rPr lang="en-US" dirty="0" smtClean="0"/>
-              <a:t>Start </a:t>
-            </a:r>
-            <a:r>
-              <a:rPr lang="en-US" dirty="0" smtClean="0"/>
-              <a:t>it as follows</a:t>
+              <a:t>Start it as follows</a:t>
             </a:r>
           </a:p>
           <a:p>
@@ -18153,8 +18117,25 @@
             </a:r>
             <a:r>
               <a:rPr lang="en-US" dirty="0" smtClean="0"/>
-              <a:t>target/cloudinary-image-server-1.0-SNAPSHOT.jar</a:t>
-            </a:r>
+              <a:t>target/cloudinary-image-server-1.0-SNAPSHOT.jar </a:t>
+            </a:r>
+            <a:r>
+              <a:rPr lang="en-US" dirty="0"/>
+              <a:t>--</a:t>
+            </a:r>
+            <a:r>
+              <a:rPr lang="en-US" dirty="0" err="1"/>
+              <a:t>spring.config.location</a:t>
+            </a:r>
+            <a:r>
+              <a:rPr lang="en-US" dirty="0"/>
+              <a:t>=</a:t>
+            </a:r>
+            <a:r>
+              <a:rPr lang="en-US" dirty="0" err="1"/>
+              <a:t>cloudinary.yaml</a:t>
+            </a:r>
+            <a:endParaRPr lang="en-US" dirty="0" smtClean="0"/>
           </a:p>
           <a:p>
             <a:r>
@@ -18429,25 +18410,6 @@
               </a:rPr>
               <a:t>cloudinary.com/blog</a:t>
             </a:r>
-            <a:endParaRPr lang="en-US" dirty="0" smtClean="0"/>
-          </a:p>
-          <a:p>
-            <a:r>
-              <a:rPr lang="en-US" dirty="0"/>
-              <a:t>Product image rendering examples </a:t>
-            </a:r>
-            <a:br>
-              <a:rPr lang="en-US" dirty="0"/>
-            </a:br>
-            <a:r>
-              <a:rPr lang="en-US" dirty="0">
-                <a:hlinkClick r:id="rId5"/>
-              </a:rPr>
-              <a:t>https://spaces.spreadomat.net/display/IT/Rendering+Product+Images+with+Cloudinary</a:t>
-            </a:r>
-            <a:endParaRPr lang="en-US" dirty="0"/>
-          </a:p>
-          <a:p>
             <a:endParaRPr lang="en-US" dirty="0" smtClean="0"/>
           </a:p>
         </p:txBody>

</xml_diff>

<commit_message>
fixed wording in presentation
</commit_message>
<xml_diff>
--- a/rendering_spreadshirt_product_images_using_cloudinary.pptx
+++ b/rendering_spreadshirt_product_images_using_cloudinary.pptx
@@ -16360,7 +16360,15 @@
           <a:p>
             <a:r>
               <a:rPr lang="en-US" dirty="0" smtClean="0"/>
-              <a:t>Hiding the Ugly URLs</a:t>
+              <a:t>Hiding the </a:t>
+            </a:r>
+            <a:r>
+              <a:rPr lang="en-US" dirty="0" smtClean="0"/>
+              <a:t>“Ugly” </a:t>
+            </a:r>
+            <a:r>
+              <a:rPr lang="en-US" dirty="0" smtClean="0"/>
+              <a:t>URLs</a:t>
             </a:r>
             <a:endParaRPr lang="en-US" dirty="0"/>
           </a:p>
@@ -16914,15 +16922,7 @@
             </a:r>
             <a:r>
               <a:rPr lang="en-US" dirty="0" smtClean="0"/>
-              <a:t> – Put </a:t>
-            </a:r>
-            <a:r>
-              <a:rPr lang="en-US" dirty="0" smtClean="0"/>
-              <a:t>view, </a:t>
-            </a:r>
-            <a:r>
-              <a:rPr lang="en-US" dirty="0" smtClean="0"/>
-              <a:t>appearance, </a:t>
+              <a:t> – Put view, appearance, </a:t>
             </a:r>
             <a:r>
               <a:rPr lang="is-IS" dirty="0" smtClean="0"/>
@@ -18981,7 +18981,11 @@
             <a:pPr lvl="1"/>
             <a:r>
               <a:rPr lang="en-US" b="1" dirty="0"/>
-              <a:t>Solves problem of ugly </a:t>
+              <a:t>Solves problem of </a:t>
+            </a:r>
+            <a:r>
+              <a:rPr lang="en-US" b="1" dirty="0" smtClean="0"/>
+              <a:t>“ugly” </a:t>
             </a:r>
             <a:r>
               <a:rPr lang="en-US" b="1" dirty="0" err="1"/>

</xml_diff>